<commit_message>
IPAC poster v.1 done
</commit_message>
<xml_diff>
--- a/Reports/IPAC17_poster.pptx
+++ b/Reports/IPAC17_poster.pptx
@@ -193,7 +193,8 @@
           <a:p>
             <a:fld id="{721DFFC4-4194-4356-AF36-C24452EFB25D}" type="datetimeFigureOut">
               <a:rPr lang="ru-RU" smtClean="0"/>
-              <a:t>26.04.2017</a:t>
+              <a:pPr/>
+              <a:t>01.05.2017</a:t>
             </a:fld>
             <a:endParaRPr lang="ru-RU"/>
           </a:p>
@@ -354,6 +355,7 @@
           <a:p>
             <a:fld id="{8449F883-0AB5-4D8C-9564-B259766E061A}" type="slidenum">
               <a:rPr lang="ru-RU" smtClean="0"/>
+              <a:pPr/>
               <a:t>‹#›</a:t>
             </a:fld>
             <a:endParaRPr lang="ru-RU"/>
@@ -1523,7 +1525,7 @@
                 </a:spcBef>
                 <a:defRPr/>
               </a:pPr>
-              <a:t>26. April 2017</a:t>
+              <a:t>1. Mai 2017</a:t>
             </a:fld>
             <a:endParaRPr lang="de-DE" altLang="en-US" sz="6400" smtClean="0">
               <a:solidFill>
@@ -6399,7 +6401,7 @@
               <a:pPr eaLnBrk="1" hangingPunct="1">
                 <a:defRPr/>
               </a:pPr>
-              <a:t>26. April 2017</a:t>
+              <a:t>1. Mai 2017</a:t>
             </a:fld>
             <a:endParaRPr lang="de-DE" altLang="en-US" sz="4600" smtClean="0">
               <a:solidFill>
@@ -7484,7 +7486,7 @@
       </p:grpSpPr>
       <p:pic>
         <p:nvPicPr>
-          <p:cNvPr id="16" name="Picture 15" descr="Asymmetry.png"/>
+          <p:cNvPr id="18" name="Picture 17" descr="Logo_2017.tiff"/>
           <p:cNvPicPr>
             <a:picLocks noChangeAspect="1"/>
           </p:cNvPicPr>
@@ -7492,54 +7494,6 @@
         </p:nvPicPr>
         <p:blipFill>
           <a:blip r:embed="rId3" cstate="print"/>
-          <a:stretch>
-            <a:fillRect/>
-          </a:stretch>
-        </p:blipFill>
-        <p:spPr>
-          <a:xfrm>
-            <a:off x="20252556" y="20252134"/>
-            <a:ext cx="9721079" cy="10099992"/>
-          </a:xfrm>
-          <a:prstGeom prst="rect">
-            <a:avLst/>
-          </a:prstGeom>
-        </p:spPr>
-      </p:pic>
-      <p:pic>
-        <p:nvPicPr>
-          <p:cNvPr id="15" name="Picture 14" descr="DetCntRts.png"/>
-          <p:cNvPicPr>
-            <a:picLocks noChangeAspect="1"/>
-          </p:cNvPicPr>
-          <p:nvPr/>
-        </p:nvPicPr>
-        <p:blipFill>
-          <a:blip r:embed="rId4" cstate="print"/>
-          <a:stretch>
-            <a:fillRect/>
-          </a:stretch>
-        </p:blipFill>
-        <p:spPr>
-          <a:xfrm>
-            <a:off x="810395" y="20775838"/>
-            <a:ext cx="9217024" cy="9576288"/>
-          </a:xfrm>
-          <a:prstGeom prst="rect">
-            <a:avLst/>
-          </a:prstGeom>
-        </p:spPr>
-      </p:pic>
-      <p:pic>
-        <p:nvPicPr>
-          <p:cNvPr id="18" name="Picture 17" descr="Logo_2017.tiff"/>
-          <p:cNvPicPr>
-            <a:picLocks noChangeAspect="1"/>
-          </p:cNvPicPr>
-          <p:nvPr/>
-        </p:nvPicPr>
-        <p:blipFill>
-          <a:blip r:embed="rId5" cstate="print"/>
           <a:stretch>
             <a:fillRect/>
           </a:stretch>
@@ -7563,7 +7517,7 @@
           <p:nvPr/>
         </p:nvPicPr>
         <p:blipFill>
-          <a:blip r:embed="rId6" cstate="print"/>
+          <a:blip r:embed="rId4" cstate="print"/>
           <a:stretch>
             <a:fillRect/>
           </a:stretch>
@@ -7578,46 +7532,6 @@
           </a:prstGeom>
         </p:spPr>
       </p:pic>
-      <p:graphicFrame>
-        <p:nvGraphicFramePr>
-          <p:cNvPr id="32" name="Object 31"/>
-          <p:cNvGraphicFramePr>
-            <a:graphicFrameLocks noChangeAspect="1"/>
-          </p:cNvGraphicFramePr>
-          <p:nvPr/>
-        </p:nvGraphicFramePr>
-        <p:xfrm>
-          <a:off x="10254456" y="21456650"/>
-          <a:ext cx="9771063" cy="1212850"/>
-        </p:xfrm>
-        <a:graphic>
-          <a:graphicData uri="http://schemas.openxmlformats.org/presentationml/2006/ole">
-            <p:oleObj spid="_x0000_s1029" name="Equation" r:id="rId7" imgW="2387520" imgH="253800" progId="Equation.3">
-              <p:embed/>
-            </p:oleObj>
-          </a:graphicData>
-        </a:graphic>
-      </p:graphicFrame>
-      <p:graphicFrame>
-        <p:nvGraphicFramePr>
-          <p:cNvPr id="33" name="Object 32"/>
-          <p:cNvGraphicFramePr>
-            <a:graphicFrameLocks noChangeAspect="1"/>
-          </p:cNvGraphicFramePr>
-          <p:nvPr/>
-        </p:nvGraphicFramePr>
-        <p:xfrm>
-          <a:off x="10019506" y="24152918"/>
-          <a:ext cx="10240963" cy="2147888"/>
-        </p:xfrm>
-        <a:graphic>
-          <a:graphicData uri="http://schemas.openxmlformats.org/presentationml/2006/ole">
-            <p:oleObj spid="_x0000_s1030" name="Equation" r:id="rId8" imgW="2057400" imgH="431640" progId="Equation.3">
-              <p:embed/>
-            </p:oleObj>
-          </a:graphicData>
-        </a:graphic>
-      </p:graphicFrame>
       <p:grpSp>
         <p:nvGrpSpPr>
           <p:cNvPr id="41" name="Group 40"/>
@@ -7641,7 +7555,7 @@
             <p:nvPr/>
           </p:nvPicPr>
           <p:blipFill>
-            <a:blip r:embed="rId9" cstate="print"/>
+            <a:blip r:embed="rId5" cstate="print"/>
             <a:stretch>
               <a:fillRect/>
             </a:stretch>
@@ -7821,7 +7735,7 @@
                 <p:nvPr/>
               </p:nvPicPr>
               <p:blipFill>
-                <a:blip r:embed="rId10" cstate="print"/>
+                <a:blip r:embed="rId6" cstate="print"/>
                 <a:stretch>
                   <a:fillRect/>
                 </a:stretch>
@@ -8040,7 +7954,7 @@
             </p:xfrm>
             <a:graphic>
               <a:graphicData uri="http://schemas.openxmlformats.org/presentationml/2006/ole">
-                <p:oleObj spid="_x0000_s1026" name="Equation" r:id="rId11" imgW="3174840" imgH="914400" progId="Equation.3">
+                <p:oleObj spid="_x0000_s1026" name="Equation" r:id="rId7" imgW="3174840" imgH="914400" progId="Equation.3">
                   <p:embed/>
                 </p:oleObj>
               </a:graphicData>
@@ -8119,7 +8033,7 @@
               </p:xfrm>
               <a:graphic>
                 <a:graphicData uri="http://schemas.openxmlformats.org/presentationml/2006/ole">
-                  <p:oleObj spid="_x0000_s1027" name="Equation" r:id="rId12" imgW="507960" imgH="241200" progId="Equation.3">
+                  <p:oleObj spid="_x0000_s1027" name="Equation" r:id="rId8" imgW="507960" imgH="241200" progId="Equation.3">
                     <p:embed/>
                   </p:oleObj>
                 </a:graphicData>
@@ -8155,7 +8069,7 @@
                   <a:avLst/>
                 </a:prstGeom>
                 <a:solidFill>
-                  <a:srgbClr val="0070C0">
+                  <a:srgbClr val="00B0F0">
                     <a:alpha val="20000"/>
                   </a:srgbClr>
                 </a:solidFill>
@@ -8205,7 +8119,7 @@
               </p:xfrm>
               <a:graphic>
                 <a:graphicData uri="http://schemas.openxmlformats.org/presentationml/2006/ole">
-                  <p:oleObj spid="_x0000_s1028" name="Equation" r:id="rId13" imgW="380880" imgH="241200" progId="Equation.3">
+                  <p:oleObj spid="_x0000_s1028" name="Equation" r:id="rId9" imgW="380880" imgH="241200" progId="Equation.3">
                     <p:embed/>
                   </p:oleObj>
                 </a:graphicData>
@@ -8325,50 +8239,129 @@
           </p:txBody>
         </p:sp>
       </p:grpSp>
-      <p:graphicFrame>
-        <p:nvGraphicFramePr>
-          <p:cNvPr id="43" name="Object 42"/>
-          <p:cNvGraphicFramePr>
-            <a:graphicFrameLocks noChangeAspect="1"/>
-          </p:cNvGraphicFramePr>
+      <p:grpSp>
+        <p:nvGrpSpPr>
+          <p:cNvPr id="47" name="Group 46"/>
+          <p:cNvGrpSpPr/>
           <p:nvPr/>
-        </p:nvGraphicFramePr>
-        <p:xfrm>
-          <a:off x="11187730" y="27327790"/>
-          <a:ext cx="7904514" cy="3024336"/>
-        </p:xfrm>
-        <a:graphic>
-          <a:graphicData uri="http://schemas.openxmlformats.org/presentationml/2006/ole">
-            <p:oleObj spid="_x0000_s1034" name="Equation" r:id="rId14" imgW="1460160" imgH="558720" progId="Equation.3">
-              <p:embed/>
-            </p:oleObj>
-          </a:graphicData>
-        </a:graphic>
-      </p:graphicFrame>
-      <p:pic>
-        <p:nvPicPr>
-          <p:cNvPr id="44" name="Picture 43" descr="Fisher_Plot.PNG"/>
-          <p:cNvPicPr>
-            <a:picLocks noChangeAspect="1"/>
-          </p:cNvPicPr>
-          <p:nvPr/>
-        </p:nvPicPr>
-        <p:blipFill>
-          <a:blip r:embed="rId15" cstate="print"/>
-          <a:stretch>
-            <a:fillRect/>
-          </a:stretch>
-        </p:blipFill>
-        <p:spPr>
+        </p:nvGrpSpPr>
+        <p:grpSpPr>
           <a:xfrm>
-            <a:off x="810395" y="30549278"/>
-            <a:ext cx="9767264" cy="6192688"/>
+            <a:off x="810395" y="20252134"/>
+            <a:ext cx="29163240" cy="10099992"/>
+            <a:chOff x="810395" y="20252134"/>
+            <a:chExt cx="29163240" cy="10099992"/>
           </a:xfrm>
-          <a:prstGeom prst="rect">
-            <a:avLst/>
-          </a:prstGeom>
-        </p:spPr>
-      </p:pic>
+        </p:grpSpPr>
+        <p:pic>
+          <p:nvPicPr>
+            <p:cNvPr id="16" name="Picture 15" descr="Asymmetry.png"/>
+            <p:cNvPicPr>
+              <a:picLocks noChangeAspect="1"/>
+            </p:cNvPicPr>
+            <p:nvPr/>
+          </p:nvPicPr>
+          <p:blipFill>
+            <a:blip r:embed="rId10" cstate="print"/>
+            <a:stretch>
+              <a:fillRect/>
+            </a:stretch>
+          </p:blipFill>
+          <p:spPr>
+            <a:xfrm>
+              <a:off x="20252556" y="20252134"/>
+              <a:ext cx="9721079" cy="10099992"/>
+            </a:xfrm>
+            <a:prstGeom prst="rect">
+              <a:avLst/>
+            </a:prstGeom>
+          </p:spPr>
+        </p:pic>
+        <p:pic>
+          <p:nvPicPr>
+            <p:cNvPr id="15" name="Picture 14" descr="DetCntRts.png"/>
+            <p:cNvPicPr>
+              <a:picLocks noChangeAspect="1"/>
+            </p:cNvPicPr>
+            <p:nvPr/>
+          </p:nvPicPr>
+          <p:blipFill>
+            <a:blip r:embed="rId11" cstate="print"/>
+            <a:stretch>
+              <a:fillRect/>
+            </a:stretch>
+          </p:blipFill>
+          <p:spPr>
+            <a:xfrm>
+              <a:off x="810395" y="20775838"/>
+              <a:ext cx="9217024" cy="9576288"/>
+            </a:xfrm>
+            <a:prstGeom prst="rect">
+              <a:avLst/>
+            </a:prstGeom>
+          </p:spPr>
+        </p:pic>
+        <p:graphicFrame>
+          <p:nvGraphicFramePr>
+            <p:cNvPr id="32" name="Object 31"/>
+            <p:cNvGraphicFramePr>
+              <a:graphicFrameLocks noChangeAspect="1"/>
+            </p:cNvGraphicFramePr>
+            <p:nvPr/>
+          </p:nvGraphicFramePr>
+          <p:xfrm>
+            <a:off x="10254456" y="21456650"/>
+            <a:ext cx="9771063" cy="1212850"/>
+          </p:xfrm>
+          <a:graphic>
+            <a:graphicData uri="http://schemas.openxmlformats.org/presentationml/2006/ole">
+              <p:oleObj spid="_x0000_s1029" name="Equation" r:id="rId12" imgW="2387520" imgH="253800" progId="Equation.3">
+                <p:embed/>
+              </p:oleObj>
+            </a:graphicData>
+          </a:graphic>
+        </p:graphicFrame>
+        <p:graphicFrame>
+          <p:nvGraphicFramePr>
+            <p:cNvPr id="33" name="Object 32"/>
+            <p:cNvGraphicFramePr>
+              <a:graphicFrameLocks noChangeAspect="1"/>
+            </p:cNvGraphicFramePr>
+            <p:nvPr/>
+          </p:nvGraphicFramePr>
+          <p:xfrm>
+            <a:off x="10019506" y="24152918"/>
+            <a:ext cx="10240963" cy="2147888"/>
+          </p:xfrm>
+          <a:graphic>
+            <a:graphicData uri="http://schemas.openxmlformats.org/presentationml/2006/ole">
+              <p:oleObj spid="_x0000_s1030" name="Equation" r:id="rId13" imgW="2057400" imgH="431640" progId="Equation.3">
+                <p:embed/>
+              </p:oleObj>
+            </a:graphicData>
+          </a:graphic>
+        </p:graphicFrame>
+        <p:graphicFrame>
+          <p:nvGraphicFramePr>
+            <p:cNvPr id="43" name="Object 42"/>
+            <p:cNvGraphicFramePr>
+              <a:graphicFrameLocks noChangeAspect="1"/>
+            </p:cNvGraphicFramePr>
+            <p:nvPr/>
+          </p:nvGraphicFramePr>
+          <p:xfrm>
+            <a:off x="11187730" y="27327790"/>
+            <a:ext cx="7904514" cy="3024336"/>
+          </p:xfrm>
+          <a:graphic>
+            <a:graphicData uri="http://schemas.openxmlformats.org/presentationml/2006/ole">
+              <p:oleObj spid="_x0000_s1034" name="Equation" r:id="rId14" imgW="1460160" imgH="558720" progId="Equation.3">
+                <p:embed/>
+              </p:oleObj>
+            </a:graphicData>
+          </a:graphic>
+        </p:graphicFrame>
+      </p:grpSp>
       <p:graphicFrame>
         <p:nvGraphicFramePr>
           <p:cNvPr id="45" name="Table 44"/>
@@ -8378,8 +8371,8 @@
           <p:nvPr/>
         </p:nvGraphicFramePr>
         <p:xfrm>
-          <a:off x="1242443" y="37246022"/>
-          <a:ext cx="9649072" cy="5040560"/>
+          <a:off x="882403" y="37102006"/>
+          <a:ext cx="9793088" cy="5207228"/>
         </p:xfrm>
         <a:graphic>
           <a:graphicData uri="http://schemas.openxmlformats.org/drawingml/2006/table">
@@ -8388,10 +8381,10 @@
                 <a:tableStyleId>{5C22544A-7EE6-4342-B048-85BDC9FD1C3A}</a:tableStyleId>
               </a:tblPr>
               <a:tblGrid>
-                <a:gridCol w="4824536"/>
-                <a:gridCol w="4824536"/>
+                <a:gridCol w="4896544"/>
+                <a:gridCol w="4896544"/>
               </a:tblGrid>
-              <a:tr h="855944">
+              <a:tr h="884246">
                 <a:tc>
                   <a:txBody>
                     <a:bodyPr/>
@@ -8437,7 +8430,7 @@
                   </a:tcPr>
                 </a:tc>
               </a:tr>
-              <a:tr h="1394872">
+              <a:tr h="1440994">
                 <a:tc>
                   <a:txBody>
                     <a:bodyPr/>
@@ -8469,7 +8462,7 @@
                   <a:tcPr/>
                 </a:tc>
               </a:tr>
-              <a:tr h="1394872">
+              <a:tr h="1440994">
                 <a:tc>
                   <a:txBody>
                     <a:bodyPr/>
@@ -8501,7 +8494,7 @@
                   <a:tcPr/>
                 </a:tc>
               </a:tr>
-              <a:tr h="1394872">
+              <a:tr h="1440994">
                 <a:tc>
                   <a:txBody>
                     <a:bodyPr/>
@@ -8537,16 +8530,130 @@
           </a:graphicData>
         </a:graphic>
       </p:graphicFrame>
+      <p:pic>
+        <p:nvPicPr>
+          <p:cNvPr id="44" name="Picture 43" descr="Fisher_Plot.PNG"/>
+          <p:cNvPicPr>
+            <a:picLocks noChangeAspect="1"/>
+          </p:cNvPicPr>
+          <p:nvPr/>
+        </p:nvPicPr>
+        <p:blipFill>
+          <a:blip r:embed="rId15" cstate="print"/>
+          <a:stretch>
+            <a:fillRect/>
+          </a:stretch>
+        </p:blipFill>
+        <p:spPr>
+          <a:xfrm>
+            <a:off x="810395" y="30549278"/>
+            <a:ext cx="9767264" cy="6192688"/>
+          </a:xfrm>
+          <a:prstGeom prst="rect">
+            <a:avLst/>
+          </a:prstGeom>
+        </p:spPr>
+      </p:pic>
+      <p:grpSp>
+        <p:nvGrpSpPr>
+          <p:cNvPr id="50" name="Group 49"/>
+          <p:cNvGrpSpPr/>
+          <p:nvPr/>
+        </p:nvGrpSpPr>
+        <p:grpSpPr>
+          <a:xfrm>
+            <a:off x="10891515" y="30765302"/>
+            <a:ext cx="10585176" cy="4824536"/>
+            <a:chOff x="10891515" y="30765302"/>
+            <a:chExt cx="10585176" cy="4824536"/>
+          </a:xfrm>
+        </p:grpSpPr>
+        <p:sp>
+          <p:nvSpPr>
+            <p:cNvPr id="46" name="TextBox 45"/>
+            <p:cNvSpPr txBox="1"/>
+            <p:nvPr/>
+          </p:nvSpPr>
+          <p:spPr>
+            <a:xfrm>
+              <a:off x="10891515" y="30765302"/>
+              <a:ext cx="10585176" cy="2308324"/>
+            </a:xfrm>
+            <a:prstGeom prst="rect">
+              <a:avLst/>
+            </a:prstGeom>
+            <a:noFill/>
+          </p:spPr>
+          <p:txBody>
+            <a:bodyPr wrap="square" rtlCol="0">
+              <a:spAutoFit/>
+            </a:bodyPr>
+            <a:lstStyle/>
+            <a:p>
+              <a:pPr>
+                <a:buFont typeface="Arial" pitchFamily="34" charset="0"/>
+                <a:buChar char="•"/>
+              </a:pPr>
+              <a:r>
+                <a:rPr lang="en-US" sz="4800" dirty="0" smtClean="0"/>
+                <a:t> Uniform sampling</a:t>
+              </a:r>
+            </a:p>
+            <a:p>
+              <a:pPr>
+                <a:buFont typeface="Arial" pitchFamily="34" charset="0"/>
+                <a:buChar char="•"/>
+              </a:pPr>
+              <a:r>
+                <a:rPr lang="en-US" sz="4800" dirty="0"/>
+                <a:t> </a:t>
+              </a:r>
+              <a:r>
+                <a:rPr lang="en-US" sz="4800" dirty="0" smtClean="0"/>
+                <a:t>Sample size equivalent to 2,000 events/20 </a:t>
+              </a:r>
+              <a:r>
+                <a:rPr lang="en-US" sz="4800" dirty="0" err="1" smtClean="0"/>
+                <a:t>millisec</a:t>
+              </a:r>
+              <a:r>
+                <a:rPr lang="en-US" sz="4800" dirty="0" smtClean="0"/>
+                <a:t> for 1000 sec</a:t>
+              </a:r>
+            </a:p>
+          </p:txBody>
+        </p:sp>
+        <p:graphicFrame>
+          <p:nvGraphicFramePr>
+            <p:cNvPr id="48" name="Object 47"/>
+            <p:cNvGraphicFramePr>
+              <a:graphicFrameLocks noChangeAspect="1"/>
+            </p:cNvGraphicFramePr>
+            <p:nvPr/>
+          </p:nvGraphicFramePr>
+          <p:xfrm>
+            <a:off x="10892010" y="34076951"/>
+            <a:ext cx="10080625" cy="1512887"/>
+          </p:xfrm>
+          <a:graphic>
+            <a:graphicData uri="http://schemas.openxmlformats.org/presentationml/2006/ole">
+              <p:oleObj spid="_x0000_s1036" name="Equation" r:id="rId16" imgW="1523880" imgH="228600" progId="Equation.3">
+                <p:embed/>
+              </p:oleObj>
+            </a:graphicData>
+          </a:graphic>
+        </p:graphicFrame>
+      </p:grpSp>
       <p:sp>
         <p:nvSpPr>
-          <p:cNvPr id="46" name="TextBox 45"/>
+          <p:cNvPr id="34" name="TextBox 33"/>
           <p:cNvSpPr txBox="1"/>
           <p:nvPr/>
         </p:nvSpPr>
         <p:spPr>
           <a:xfrm>
-            <a:off x="10891515" y="30765302"/>
-            <a:ext cx="10585176" cy="2308324"/>
+            <a:off x="10891515" y="36525942"/>
+            <a:ext cx="10585176" cy="6001643"/>
           </a:xfrm>
           <a:prstGeom prst="rect">
             <a:avLst/>
@@ -8559,13 +8666,171 @@
           </a:bodyPr>
           <a:lstStyle/>
           <a:p>
+            <a:r>
+              <a:rPr lang="en-US" sz="4800" dirty="0" smtClean="0"/>
+              <a:t>By modulating the sampling frequency we can potentially improve the precision of the frequency estimate by a factor of </a:t>
+            </a:r>
+            <a:r>
+              <a:rPr lang="en-US" sz="4800" dirty="0" smtClean="0">
+                <a:latin typeface="Arial"/>
+                <a:cs typeface="Arial"/>
+              </a:rPr>
+              <a:t>√2</a:t>
+            </a:r>
+            <a:r>
+              <a:rPr lang="en-US" sz="4800" dirty="0" smtClean="0"/>
+              <a:t> </a:t>
+            </a:r>
+          </a:p>
+          <a:p>
+            <a:endParaRPr lang="en-US" sz="4800" dirty="0" smtClean="0"/>
+          </a:p>
+          <a:p>
+            <a:r>
+              <a:rPr lang="en-US" sz="4800" dirty="0" smtClean="0"/>
+              <a:t>An error on the order of 10</a:t>
+            </a:r>
+            <a:r>
+              <a:rPr lang="en-US" sz="4800" baseline="30000" dirty="0" smtClean="0"/>
+              <a:t>-6</a:t>
+            </a:r>
+            <a:r>
+              <a:rPr lang="en-US" sz="4800" dirty="0" smtClean="0"/>
+              <a:t> </a:t>
+            </a:r>
+            <a:r>
+              <a:rPr lang="en-US" sz="4800" dirty="0" err="1" smtClean="0"/>
+              <a:t>rad</a:t>
+            </a:r>
+            <a:r>
+              <a:rPr lang="en-US" sz="4800" dirty="0" smtClean="0"/>
+              <a:t>/sec is sufficient for a 30% improvement in precision</a:t>
+            </a:r>
+            <a:endParaRPr lang="ru-RU" sz="4800" dirty="0"/>
+          </a:p>
+        </p:txBody>
+      </p:sp>
+      <p:sp>
+        <p:nvSpPr>
+          <p:cNvPr id="36" name="TextBox 35"/>
+          <p:cNvSpPr txBox="1"/>
+          <p:nvPr/>
+        </p:nvSpPr>
+        <p:spPr>
+          <a:xfrm>
+            <a:off x="21620707" y="31409479"/>
+            <a:ext cx="8208912" cy="10445055"/>
+          </a:xfrm>
+          <a:prstGeom prst="roundRect">
+            <a:avLst/>
+          </a:prstGeom>
+        </p:spPr>
+        <p:style>
+          <a:lnRef idx="2">
+            <a:schemeClr val="accent6"/>
+          </a:lnRef>
+          <a:fillRef idx="1">
+            <a:schemeClr val="lt1"/>
+          </a:fillRef>
+          <a:effectRef idx="0">
+            <a:schemeClr val="accent6"/>
+          </a:effectRef>
+          <a:fontRef idx="minor">
+            <a:schemeClr val="dk1"/>
+          </a:fontRef>
+        </p:style>
+        <p:txBody>
+          <a:bodyPr wrap="square" rtlCol="0">
+            <a:spAutoFit/>
+          </a:bodyPr>
+          <a:lstStyle/>
+          <a:p>
             <a:pPr>
               <a:buFont typeface="Arial" pitchFamily="34" charset="0"/>
               <a:buChar char="•"/>
             </a:pPr>
             <a:r>
               <a:rPr lang="en-US" sz="4800" dirty="0" smtClean="0"/>
-              <a:t> Uniform sampling</a:t>
+              <a:t> A measurement of the EDM on the order of </a:t>
+            </a:r>
+            <a:r>
+              <a:rPr lang="en-US" sz="4800" b="1" dirty="0" smtClean="0"/>
+              <a:t>10</a:t>
+            </a:r>
+            <a:r>
+              <a:rPr lang="en-US" sz="4800" b="1" baseline="30000" dirty="0" smtClean="0"/>
+              <a:t>-29</a:t>
+            </a:r>
+            <a:r>
+              <a:rPr lang="en-US" sz="4800" b="1" dirty="0" smtClean="0"/>
+              <a:t> </a:t>
+            </a:r>
+            <a:r>
+              <a:rPr lang="en-US" sz="4800" b="1" dirty="0" err="1" smtClean="0"/>
+              <a:t>e</a:t>
+            </a:r>
+            <a:r>
+              <a:rPr lang="en-US" sz="4800" b="1" dirty="0" err="1" smtClean="0">
+                <a:latin typeface="Arial"/>
+                <a:cs typeface="Arial"/>
+              </a:rPr>
+              <a:t>∙cm</a:t>
+            </a:r>
+            <a:r>
+              <a:rPr lang="en-US" sz="4800" b="1" dirty="0" smtClean="0">
+                <a:latin typeface="Arial"/>
+                <a:cs typeface="Arial"/>
+              </a:rPr>
+              <a:t> </a:t>
+            </a:r>
+            <a:r>
+              <a:rPr lang="en-US" sz="4800" dirty="0" smtClean="0">
+                <a:latin typeface="Arial"/>
+                <a:cs typeface="Arial"/>
+              </a:rPr>
+              <a:t>requires a standard error of the frequency estimate be better than </a:t>
+            </a:r>
+            <a:r>
+              <a:rPr lang="en-US" sz="4800" b="1" dirty="0" smtClean="0">
+                <a:latin typeface="Arial"/>
+                <a:cs typeface="Arial"/>
+              </a:rPr>
+              <a:t>10</a:t>
+            </a:r>
+            <a:r>
+              <a:rPr lang="en-US" sz="4800" b="1" baseline="30000" dirty="0" smtClean="0">
+                <a:latin typeface="Arial"/>
+                <a:cs typeface="Arial"/>
+              </a:rPr>
+              <a:t>-9</a:t>
+            </a:r>
+            <a:r>
+              <a:rPr lang="en-US" sz="4800" b="1" dirty="0" smtClean="0">
+                <a:latin typeface="Arial"/>
+                <a:cs typeface="Arial"/>
+              </a:rPr>
+              <a:t> </a:t>
+            </a:r>
+            <a:r>
+              <a:rPr lang="en-US" sz="4800" b="1" dirty="0" err="1" smtClean="0">
+                <a:latin typeface="Arial"/>
+                <a:cs typeface="Arial"/>
+              </a:rPr>
+              <a:t>rad</a:t>
+            </a:r>
+            <a:r>
+              <a:rPr lang="en-US" sz="4800" b="1" dirty="0" smtClean="0">
+                <a:latin typeface="Arial"/>
+                <a:cs typeface="Arial"/>
+              </a:rPr>
+              <a:t>/sec</a:t>
+            </a:r>
+            <a:r>
+              <a:rPr lang="en-US" sz="4800" dirty="0" smtClean="0">
+                <a:latin typeface="Arial"/>
+                <a:cs typeface="Arial"/>
+              </a:rPr>
+              <a:t> </a:t>
             </a:r>
           </a:p>
           <a:p>
@@ -8573,45 +8838,40 @@
               <a:buFont typeface="Arial" pitchFamily="34" charset="0"/>
               <a:buChar char="•"/>
             </a:pPr>
-            <a:r>
-              <a:rPr lang="en-US" sz="4800" dirty="0"/>
-              <a:t> </a:t>
-            </a:r>
-            <a:r>
-              <a:rPr lang="en-US" sz="4800" dirty="0" smtClean="0"/>
-              <a:t>Sample size equivalent to 2,000 events/20 </a:t>
-            </a:r>
-            <a:r>
-              <a:rPr lang="en-US" sz="4800" dirty="0" err="1" smtClean="0"/>
-              <a:t>millisec</a:t>
-            </a:r>
-            <a:r>
-              <a:rPr lang="en-US" sz="4800" dirty="0" smtClean="0"/>
-              <a:t> for 1000 sec</a:t>
+            <a:endParaRPr lang="en-US" sz="4800" dirty="0" smtClean="0">
+              <a:latin typeface="Arial"/>
+              <a:cs typeface="Arial"/>
+            </a:endParaRPr>
+          </a:p>
+          <a:p>
+            <a:pPr>
+              <a:buFont typeface="Arial" pitchFamily="34" charset="0"/>
+              <a:buChar char="•"/>
+            </a:pPr>
+            <a:r>
+              <a:rPr lang="en-US" sz="4800" dirty="0" smtClean="0">
+                <a:latin typeface="Arial"/>
+                <a:cs typeface="Arial"/>
+              </a:rPr>
+              <a:t> Modeling shows that such precision can be achieved in </a:t>
+            </a:r>
+            <a:r>
+              <a:rPr lang="en-US" sz="4800" b="1" dirty="0" smtClean="0">
+                <a:latin typeface="Arial"/>
+                <a:cs typeface="Arial"/>
+              </a:rPr>
+              <a:t>one year </a:t>
+            </a:r>
+            <a:r>
+              <a:rPr lang="en-US" sz="4800" dirty="0" smtClean="0">
+                <a:latin typeface="Arial"/>
+                <a:cs typeface="Arial"/>
+              </a:rPr>
+              <a:t>of measurement by the application of a modulated sampling strategy</a:t>
             </a:r>
           </a:p>
         </p:txBody>
       </p:sp>
-      <p:graphicFrame>
-        <p:nvGraphicFramePr>
-          <p:cNvPr id="48" name="Object 47"/>
-          <p:cNvGraphicFramePr>
-            <a:graphicFrameLocks noChangeAspect="1"/>
-          </p:cNvGraphicFramePr>
-          <p:nvPr/>
-        </p:nvGraphicFramePr>
-        <p:xfrm>
-          <a:off x="10243443" y="33717630"/>
-          <a:ext cx="10080625" cy="1512887"/>
-        </p:xfrm>
-        <a:graphic>
-          <a:graphicData uri="http://schemas.openxmlformats.org/presentationml/2006/ole">
-            <p:oleObj spid="_x0000_s1036" name="Equation" r:id="rId16" imgW="1523880" imgH="228600" progId="Equation.3">
-              <p:embed/>
-            </p:oleObj>
-          </a:graphicData>
-        </a:graphic>
-      </p:graphicFrame>
     </p:spTree>
   </p:cSld>
   <p:clrMapOvr>

</xml_diff>

<commit_message>
IPAC17 poster pre-print version
</commit_message>
<xml_diff>
--- a/Reports/IPAC17_poster.pptx
+++ b/Reports/IPAC17_poster.pptx
@@ -194,7 +194,7 @@
             <a:fld id="{721DFFC4-4194-4356-AF36-C24452EFB25D}" type="datetimeFigureOut">
               <a:rPr lang="ru-RU" smtClean="0"/>
               <a:pPr/>
-              <a:t>01.05.2017</a:t>
+              <a:t>08.05.2017</a:t>
             </a:fld>
             <a:endParaRPr lang="ru-RU"/>
           </a:p>
@@ -501,7 +501,7 @@
           </a:ln>
           <a:extLst>
             <a:ext uri="{91240B29-F687-4F45-9708-019B960494DF}">
-              <a14:hiddenLine xmlns:a14="http://schemas.microsoft.com/office/drawing/2010/main" xmlns="" w="9525">
+              <a14:hiddenLine xmlns="" xmlns:a14="http://schemas.microsoft.com/office/drawing/2010/main" w="9525">
                 <a:solidFill>
                   <a:srgbClr val="000000"/>
                 </a:solidFill>
@@ -650,7 +650,7 @@
           </a:ln>
           <a:extLst>
             <a:ext uri="{91240B29-F687-4F45-9708-019B960494DF}">
-              <a14:hiddenLine xmlns:a14="http://schemas.microsoft.com/office/drawing/2010/main" xmlns="" w="9525">
+              <a14:hiddenLine xmlns="" xmlns:a14="http://schemas.microsoft.com/office/drawing/2010/main" w="9525">
                 <a:solidFill>
                   <a:srgbClr val="000000"/>
                 </a:solidFill>
@@ -799,7 +799,7 @@
           </a:ln>
           <a:extLst>
             <a:ext uri="{91240B29-F687-4F45-9708-019B960494DF}">
-              <a14:hiddenLine xmlns:a14="http://schemas.microsoft.com/office/drawing/2010/main" xmlns="" w="9525">
+              <a14:hiddenLine xmlns="" xmlns:a14="http://schemas.microsoft.com/office/drawing/2010/main" w="9525">
                 <a:solidFill>
                   <a:srgbClr val="000000"/>
                 </a:solidFill>
@@ -945,7 +945,7 @@
           </a:ln>
           <a:extLst>
             <a:ext uri="{91240B29-F687-4F45-9708-019B960494DF}">
-              <a14:hiddenLine xmlns:a14="http://schemas.microsoft.com/office/drawing/2010/main" xmlns="" w="9525">
+              <a14:hiddenLine xmlns="" xmlns:a14="http://schemas.microsoft.com/office/drawing/2010/main" w="9525">
                 <a:solidFill>
                   <a:srgbClr val="000000"/>
                 </a:solidFill>
@@ -1091,7 +1091,7 @@
           </a:ln>
           <a:extLst>
             <a:ext uri="{91240B29-F687-4F45-9708-019B960494DF}">
-              <a14:hiddenLine xmlns:a14="http://schemas.microsoft.com/office/drawing/2010/main" xmlns="" w="9525">
+              <a14:hiddenLine xmlns="" xmlns:a14="http://schemas.microsoft.com/office/drawing/2010/main" w="9525">
                 <a:solidFill>
                   <a:srgbClr val="000000"/>
                 </a:solidFill>
@@ -1240,7 +1240,7 @@
           </a:ln>
           <a:extLst>
             <a:ext uri="{91240B29-F687-4F45-9708-019B960494DF}">
-              <a14:hiddenLine xmlns:a14="http://schemas.microsoft.com/office/drawing/2010/main" xmlns="" w="9525">
+              <a14:hiddenLine xmlns="" xmlns:a14="http://schemas.microsoft.com/office/drawing/2010/main" w="9525">
                 <a:solidFill>
                   <a:srgbClr val="000000"/>
                 </a:solidFill>
@@ -1384,14 +1384,14 @@
           </a:ln>
           <a:extLst>
             <a:ext uri="{909E8E84-426E-40DD-AFC4-6F175D3DCCD1}">
-              <a14:hiddenFill xmlns:a14="http://schemas.microsoft.com/office/drawing/2010/main" xmlns="">
+              <a14:hiddenFill xmlns="" xmlns:a14="http://schemas.microsoft.com/office/drawing/2010/main">
                 <a:solidFill>
                   <a:srgbClr val="FFFFFF"/>
                 </a:solidFill>
               </a14:hiddenFill>
             </a:ext>
             <a:ext uri="{91240B29-F687-4F45-9708-019B960494DF}">
-              <a14:hiddenLine xmlns:a14="http://schemas.microsoft.com/office/drawing/2010/main" xmlns="" w="9525">
+              <a14:hiddenLine xmlns="" xmlns:a14="http://schemas.microsoft.com/office/drawing/2010/main" w="9525">
                 <a:solidFill>
                   <a:srgbClr val="000000"/>
                 </a:solidFill>
@@ -1525,7 +1525,7 @@
                 </a:spcBef>
                 <a:defRPr/>
               </a:pPr>
-              <a:t>1. Mai 2017</a:t>
+              <a:t>8. Mai 2017</a:t>
             </a:fld>
             <a:endParaRPr lang="de-DE" altLang="en-US" sz="6400" smtClean="0">
               <a:solidFill>
@@ -1559,14 +1559,14 @@
           </a:ln>
           <a:extLst>
             <a:ext uri="{909E8E84-426E-40DD-AFC4-6F175D3DCCD1}">
-              <a14:hiddenFill xmlns:a14="http://schemas.microsoft.com/office/drawing/2010/main" xmlns="">
+              <a14:hiddenFill xmlns="" xmlns:a14="http://schemas.microsoft.com/office/drawing/2010/main">
                 <a:solidFill>
                   <a:srgbClr val="FFFFFF"/>
                 </a:solidFill>
               </a14:hiddenFill>
             </a:ext>
             <a:ext uri="{91240B29-F687-4F45-9708-019B960494DF}">
-              <a14:hiddenLine xmlns:a14="http://schemas.microsoft.com/office/drawing/2010/main" xmlns="" w="9525">
+              <a14:hiddenLine xmlns="" xmlns:a14="http://schemas.microsoft.com/office/drawing/2010/main" w="9525">
                 <a:solidFill>
                   <a:srgbClr val="000000"/>
                 </a:solidFill>
@@ -5536,7 +5536,7 @@
           </a:ln>
           <a:extLst>
             <a:ext uri="{91240B29-F687-4F45-9708-019B960494DF}">
-              <a14:hiddenLine xmlns:a14="http://schemas.microsoft.com/office/drawing/2010/main" xmlns="" w="9525">
+              <a14:hiddenLine xmlns="" xmlns:a14="http://schemas.microsoft.com/office/drawing/2010/main" w="9525">
                 <a:solidFill>
                   <a:srgbClr val="000000"/>
                 </a:solidFill>
@@ -5682,7 +5682,7 @@
           </a:ln>
           <a:extLst>
             <a:ext uri="{91240B29-F687-4F45-9708-019B960494DF}">
-              <a14:hiddenLine xmlns:a14="http://schemas.microsoft.com/office/drawing/2010/main" xmlns="" w="9525">
+              <a14:hiddenLine xmlns="" xmlns:a14="http://schemas.microsoft.com/office/drawing/2010/main" w="9525">
                 <a:solidFill>
                   <a:srgbClr val="000000"/>
                 </a:solidFill>
@@ -5828,7 +5828,7 @@
           </a:ln>
           <a:extLst>
             <a:ext uri="{91240B29-F687-4F45-9708-019B960494DF}">
-              <a14:hiddenLine xmlns:a14="http://schemas.microsoft.com/office/drawing/2010/main" xmlns="" w="9525">
+              <a14:hiddenLine xmlns="" xmlns:a14="http://schemas.microsoft.com/office/drawing/2010/main" w="9525">
                 <a:solidFill>
                   <a:srgbClr val="000000"/>
                 </a:solidFill>
@@ -5974,7 +5974,7 @@
           </a:ln>
           <a:extLst>
             <a:ext uri="{91240B29-F687-4F45-9708-019B960494DF}">
-              <a14:hiddenLine xmlns:a14="http://schemas.microsoft.com/office/drawing/2010/main" xmlns="" w="9525">
+              <a14:hiddenLine xmlns="" xmlns:a14="http://schemas.microsoft.com/office/drawing/2010/main" w="9525">
                 <a:solidFill>
                   <a:srgbClr val="000000"/>
                 </a:solidFill>
@@ -6123,7 +6123,7 @@
           </a:ln>
           <a:extLst>
             <a:ext uri="{91240B29-F687-4F45-9708-019B960494DF}">
-              <a14:hiddenLine xmlns:a14="http://schemas.microsoft.com/office/drawing/2010/main" xmlns="" w="9525">
+              <a14:hiddenLine xmlns="" xmlns:a14="http://schemas.microsoft.com/office/drawing/2010/main" w="9525">
                 <a:solidFill>
                   <a:srgbClr val="000000"/>
                 </a:solidFill>
@@ -6267,14 +6267,14 @@
           </a:ln>
           <a:extLst>
             <a:ext uri="{909E8E84-426E-40DD-AFC4-6F175D3DCCD1}">
-              <a14:hiddenFill xmlns:a14="http://schemas.microsoft.com/office/drawing/2010/main" xmlns="">
+              <a14:hiddenFill xmlns="" xmlns:a14="http://schemas.microsoft.com/office/drawing/2010/main">
                 <a:solidFill>
                   <a:srgbClr val="FFFFFF"/>
                 </a:solidFill>
               </a14:hiddenFill>
             </a:ext>
             <a:ext uri="{91240B29-F687-4F45-9708-019B960494DF}">
-              <a14:hiddenLine xmlns:a14="http://schemas.microsoft.com/office/drawing/2010/main" xmlns="" w="9525">
+              <a14:hiddenLine xmlns="" xmlns:a14="http://schemas.microsoft.com/office/drawing/2010/main" w="9525">
                 <a:solidFill>
                   <a:srgbClr val="000000"/>
                 </a:solidFill>
@@ -6401,7 +6401,7 @@
               <a:pPr eaLnBrk="1" hangingPunct="1">
                 <a:defRPr/>
               </a:pPr>
-              <a:t>1. Mai 2017</a:t>
+              <a:t>8. Mai 2017</a:t>
             </a:fld>
             <a:endParaRPr lang="de-DE" altLang="en-US" sz="4600" smtClean="0">
               <a:solidFill>
@@ -6434,14 +6434,14 @@
           </a:ln>
           <a:extLst>
             <a:ext uri="{909E8E84-426E-40DD-AFC4-6F175D3DCCD1}">
-              <a14:hiddenFill xmlns:a14="http://schemas.microsoft.com/office/drawing/2010/main" xmlns="">
+              <a14:hiddenFill xmlns="" xmlns:a14="http://schemas.microsoft.com/office/drawing/2010/main">
                 <a:solidFill>
                   <a:srgbClr val="FFFFFF"/>
                 </a:solidFill>
               </a14:hiddenFill>
             </a:ext>
             <a:ext uri="{91240B29-F687-4F45-9708-019B960494DF}">
-              <a14:hiddenLine xmlns:a14="http://schemas.microsoft.com/office/drawing/2010/main" xmlns="" w="9525">
+              <a14:hiddenLine xmlns="" xmlns:a14="http://schemas.microsoft.com/office/drawing/2010/main" w="9525">
                 <a:solidFill>
                   <a:srgbClr val="000000"/>
                 </a:solidFill>
@@ -7484,206 +7484,6 @@
           <a:chExt cx="0" cy="0"/>
         </a:xfrm>
       </p:grpSpPr>
-      <p:pic>
-        <p:nvPicPr>
-          <p:cNvPr id="18" name="Picture 17" descr="Logo_2017.tiff"/>
-          <p:cNvPicPr>
-            <a:picLocks noChangeAspect="1"/>
-          </p:cNvPicPr>
-          <p:nvPr/>
-        </p:nvPicPr>
-        <p:blipFill>
-          <a:blip r:embed="rId3" cstate="print"/>
-          <a:stretch>
-            <a:fillRect/>
-          </a:stretch>
-        </p:blipFill>
-        <p:spPr>
-          <a:xfrm>
-            <a:off x="13555811" y="665958"/>
-            <a:ext cx="5398008" cy="2901696"/>
-          </a:xfrm>
-          <a:prstGeom prst="rect">
-            <a:avLst/>
-          </a:prstGeom>
-        </p:spPr>
-      </p:pic>
-      <p:pic>
-        <p:nvPicPr>
-          <p:cNvPr id="19" name="Picture 18" descr="logoJEDI_whitebg.png"/>
-          <p:cNvPicPr>
-            <a:picLocks noChangeAspect="1"/>
-          </p:cNvPicPr>
-          <p:nvPr/>
-        </p:nvPicPr>
-        <p:blipFill>
-          <a:blip r:embed="rId4" cstate="print"/>
-          <a:stretch>
-            <a:fillRect/>
-          </a:stretch>
-        </p:blipFill>
-        <p:spPr>
-          <a:xfrm>
-            <a:off x="19460467" y="892670"/>
-            <a:ext cx="4506022" cy="2448272"/>
-          </a:xfrm>
-          <a:prstGeom prst="rect">
-            <a:avLst/>
-          </a:prstGeom>
-        </p:spPr>
-      </p:pic>
-      <p:grpSp>
-        <p:nvGrpSpPr>
-          <p:cNvPr id="41" name="Group 40"/>
-          <p:cNvGrpSpPr/>
-          <p:nvPr/>
-        </p:nvGrpSpPr>
-        <p:grpSpPr>
-          <a:xfrm>
-            <a:off x="2322563" y="4018691"/>
-            <a:ext cx="27957412" cy="7992888"/>
-            <a:chOff x="2322563" y="4018691"/>
-            <a:chExt cx="27957412" cy="7992888"/>
-          </a:xfrm>
-        </p:grpSpPr>
-        <p:pic>
-          <p:nvPicPr>
-            <p:cNvPr id="37" name="Picture 36" descr="neutron_dipole_moment.png"/>
-            <p:cNvPicPr>
-              <a:picLocks noChangeAspect="1"/>
-            </p:cNvPicPr>
-            <p:nvPr/>
-          </p:nvPicPr>
-          <p:blipFill>
-            <a:blip r:embed="rId5" cstate="print"/>
-            <a:stretch>
-              <a:fillRect/>
-            </a:stretch>
-          </p:blipFill>
-          <p:spPr>
-            <a:xfrm>
-              <a:off x="2322563" y="4018691"/>
-              <a:ext cx="6008446" cy="7992888"/>
-            </a:xfrm>
-            <a:prstGeom prst="rect">
-              <a:avLst/>
-            </a:prstGeom>
-          </p:spPr>
-        </p:pic>
-        <p:sp>
-          <p:nvSpPr>
-            <p:cNvPr id="38" name="TextBox 37"/>
-            <p:cNvSpPr txBox="1"/>
-            <p:nvPr/>
-          </p:nvSpPr>
-          <p:spPr>
-            <a:xfrm>
-              <a:off x="9687008" y="4018691"/>
-              <a:ext cx="20592967" cy="7478970"/>
-            </a:xfrm>
-            <a:prstGeom prst="rect">
-              <a:avLst/>
-            </a:prstGeom>
-            <a:noFill/>
-          </p:spPr>
-          <p:txBody>
-            <a:bodyPr wrap="square" rtlCol="0">
-              <a:spAutoFit/>
-            </a:bodyPr>
-            <a:lstStyle/>
-            <a:p>
-              <a:pPr>
-                <a:buFont typeface="Arial" pitchFamily="34" charset="0"/>
-                <a:buChar char="•"/>
-              </a:pPr>
-              <a:r>
-                <a:rPr lang="en-US" sz="4800" dirty="0"/>
-                <a:t> </a:t>
-              </a:r>
-              <a:r>
-                <a:rPr lang="en-US" sz="4800" dirty="0" smtClean="0"/>
-                <a:t>The amount of matter in the universe far exceeds that of antimatter</a:t>
-              </a:r>
-            </a:p>
-            <a:p>
-              <a:pPr>
-                <a:buFont typeface="Arial" pitchFamily="34" charset="0"/>
-                <a:buChar char="•"/>
-              </a:pPr>
-              <a:r>
-                <a:rPr lang="en-US" sz="4800" dirty="0" smtClean="0"/>
-                <a:t> One of the Sakharov conditions for that is the violation of CP-symmetry</a:t>
-              </a:r>
-            </a:p>
-            <a:p>
-              <a:pPr>
-                <a:buFont typeface="Arial" pitchFamily="34" charset="0"/>
-                <a:buChar char="•"/>
-              </a:pPr>
-              <a:r>
-                <a:rPr lang="en-US" sz="4800" dirty="0"/>
-                <a:t> </a:t>
-              </a:r>
-              <a:r>
-                <a:rPr lang="en-US" sz="4800" dirty="0" smtClean="0"/>
-                <a:t>CP- and P-symmetry violations entail non-vanishing P- and T-violating Electric </a:t>
-              </a:r>
-              <a:r>
-                <a:rPr lang="en-US" sz="4800" dirty="0"/>
-                <a:t>D</a:t>
-              </a:r>
-              <a:r>
-                <a:rPr lang="en-US" sz="4800" dirty="0" smtClean="0"/>
-                <a:t>ipole </a:t>
-              </a:r>
-              <a:r>
-                <a:rPr lang="en-US" sz="4800" dirty="0"/>
-                <a:t>M</a:t>
-              </a:r>
-              <a:r>
-                <a:rPr lang="en-US" sz="4800" dirty="0" smtClean="0"/>
-                <a:t>oments</a:t>
-              </a:r>
-            </a:p>
-            <a:p>
-              <a:pPr>
-                <a:buFont typeface="Arial" pitchFamily="34" charset="0"/>
-                <a:buChar char="•"/>
-              </a:pPr>
-              <a:r>
-                <a:rPr lang="en-US" sz="4800" dirty="0"/>
-                <a:t> </a:t>
-              </a:r>
-              <a:r>
-                <a:rPr lang="en-US" sz="4800" dirty="0" smtClean="0"/>
-                <a:t>The SM can accommodate CP-violation, but the predicted </a:t>
-              </a:r>
-              <a:r>
-                <a:rPr lang="en-US" sz="4800" dirty="0" err="1" smtClean="0"/>
-                <a:t>baryogenesis</a:t>
-              </a:r>
-              <a:r>
-                <a:rPr lang="en-US" sz="4800" dirty="0" smtClean="0"/>
-                <a:t> rate is still far less than what one would expect; simultaneously, it predicts nucleon EDMs of magnitudes 5 orders less than the current upper bound for the neutron</a:t>
-              </a:r>
-            </a:p>
-            <a:p>
-              <a:pPr>
-                <a:buFont typeface="Arial" pitchFamily="34" charset="0"/>
-                <a:buChar char="•"/>
-              </a:pPr>
-              <a:r>
-                <a:rPr lang="en-US" sz="4800" dirty="0"/>
-                <a:t> </a:t>
-              </a:r>
-              <a:r>
-                <a:rPr lang="en-US" sz="4800" dirty="0" smtClean="0"/>
-                <a:t>Hence searches for particle EDMs promise to reveal physics beyond the SM</a:t>
-              </a:r>
-            </a:p>
-          </p:txBody>
-        </p:sp>
-      </p:grpSp>
       <p:grpSp>
         <p:nvGrpSpPr>
           <p:cNvPr id="42" name="Group 41"/>
@@ -7735,7 +7535,7 @@
                 <p:nvPr/>
               </p:nvPicPr>
               <p:blipFill>
-                <a:blip r:embed="rId6" cstate="print"/>
+                <a:blip r:embed="rId3" cstate="print"/>
                 <a:stretch>
                   <a:fillRect/>
                 </a:stretch>
@@ -7954,7 +7754,7 @@
             </p:xfrm>
             <a:graphic>
               <a:graphicData uri="http://schemas.openxmlformats.org/presentationml/2006/ole">
-                <p:oleObj spid="_x0000_s1026" name="Equation" r:id="rId7" imgW="3174840" imgH="914400" progId="Equation.3">
+                <p:oleObj spid="_x0000_s1026" name="Equation" r:id="rId4" imgW="3174840" imgH="914400" progId="Equation.3">
                   <p:embed/>
                 </p:oleObj>
               </a:graphicData>
@@ -8033,7 +7833,7 @@
               </p:xfrm>
               <a:graphic>
                 <a:graphicData uri="http://schemas.openxmlformats.org/presentationml/2006/ole">
-                  <p:oleObj spid="_x0000_s1027" name="Equation" r:id="rId8" imgW="507960" imgH="241200" progId="Equation.3">
+                  <p:oleObj spid="_x0000_s1027" name="Equation" r:id="rId5" imgW="507960" imgH="241200" progId="Equation.3">
                     <p:embed/>
                   </p:oleObj>
                 </a:graphicData>
@@ -8119,7 +7919,7 @@
               </p:xfrm>
               <a:graphic>
                 <a:graphicData uri="http://schemas.openxmlformats.org/presentationml/2006/ole">
-                  <p:oleObj spid="_x0000_s1028" name="Equation" r:id="rId9" imgW="380880" imgH="241200" progId="Equation.3">
+                  <p:oleObj spid="_x0000_s1028" name="Equation" r:id="rId6" imgW="380880" imgH="241200" progId="Equation.3">
                     <p:embed/>
                   </p:oleObj>
                 </a:graphicData>
@@ -8262,7 +8062,7 @@
             <p:nvPr/>
           </p:nvPicPr>
           <p:blipFill>
-            <a:blip r:embed="rId10" cstate="print"/>
+            <a:blip r:embed="rId7" cstate="print"/>
             <a:stretch>
               <a:fillRect/>
             </a:stretch>
@@ -8286,7 +8086,7 @@
             <p:nvPr/>
           </p:nvPicPr>
           <p:blipFill>
-            <a:blip r:embed="rId11" cstate="print"/>
+            <a:blip r:embed="rId8" cstate="print"/>
             <a:stretch>
               <a:fillRect/>
             </a:stretch>
@@ -8315,7 +8115,7 @@
           </p:xfrm>
           <a:graphic>
             <a:graphicData uri="http://schemas.openxmlformats.org/presentationml/2006/ole">
-              <p:oleObj spid="_x0000_s1029" name="Equation" r:id="rId12" imgW="2387520" imgH="253800" progId="Equation.3">
+              <p:oleObj spid="_x0000_s1029" name="Equation" r:id="rId9" imgW="2387520" imgH="253800" progId="Equation.3">
                 <p:embed/>
               </p:oleObj>
             </a:graphicData>
@@ -8335,7 +8135,7 @@
           </p:xfrm>
           <a:graphic>
             <a:graphicData uri="http://schemas.openxmlformats.org/presentationml/2006/ole">
-              <p:oleObj spid="_x0000_s1030" name="Equation" r:id="rId13" imgW="2057400" imgH="431640" progId="Equation.3">
+              <p:oleObj spid="_x0000_s1030" name="Equation" r:id="rId10" imgW="2057400" imgH="431640" progId="Equation.3">
                 <p:embed/>
               </p:oleObj>
             </a:graphicData>
@@ -8355,7 +8155,7 @@
           </p:xfrm>
           <a:graphic>
             <a:graphicData uri="http://schemas.openxmlformats.org/presentationml/2006/ole">
-              <p:oleObj spid="_x0000_s1034" name="Equation" r:id="rId14" imgW="1460160" imgH="558720" progId="Equation.3">
+              <p:oleObj spid="_x0000_s1034" name="Equation" r:id="rId11" imgW="1460160" imgH="558720" progId="Equation.3">
                 <p:embed/>
               </p:oleObj>
             </a:graphicData>
@@ -8539,7 +8339,7 @@
           <p:nvPr/>
         </p:nvPicPr>
         <p:blipFill>
-          <a:blip r:embed="rId15" cstate="print"/>
+          <a:blip r:embed="rId12" cstate="print"/>
           <a:stretch>
             <a:fillRect/>
           </a:stretch>
@@ -8637,7 +8437,7 @@
           </p:xfrm>
           <a:graphic>
             <a:graphicData uri="http://schemas.openxmlformats.org/presentationml/2006/ole">
-              <p:oleObj spid="_x0000_s1036" name="Equation" r:id="rId16" imgW="1523880" imgH="228600" progId="Equation.3">
+              <p:oleObj spid="_x0000_s1036" name="Equation" r:id="rId13" imgW="1523880" imgH="228600" progId="Equation.3">
                 <p:embed/>
               </p:oleObj>
             </a:graphicData>
@@ -8872,6 +8672,439 @@
           </a:p>
         </p:txBody>
       </p:sp>
+      <p:grpSp>
+        <p:nvGrpSpPr>
+          <p:cNvPr id="57" name="Group 56"/>
+          <p:cNvGrpSpPr/>
+          <p:nvPr/>
+        </p:nvGrpSpPr>
+        <p:grpSpPr>
+          <a:xfrm>
+            <a:off x="1054698" y="1110780"/>
+            <a:ext cx="28484297" cy="4453469"/>
+            <a:chOff x="1054698" y="1110780"/>
+            <a:chExt cx="28484297" cy="4453469"/>
+          </a:xfrm>
+        </p:grpSpPr>
+        <p:grpSp>
+          <p:nvGrpSpPr>
+            <p:cNvPr id="53" name="Group 52"/>
+            <p:cNvGrpSpPr/>
+            <p:nvPr/>
+          </p:nvGrpSpPr>
+          <p:grpSpPr>
+            <a:xfrm>
+              <a:off x="21836731" y="2595060"/>
+              <a:ext cx="7702264" cy="2221295"/>
+              <a:chOff x="21692715" y="2250133"/>
+              <a:chExt cx="7702264" cy="2221295"/>
+            </a:xfrm>
+          </p:grpSpPr>
+          <p:pic>
+            <p:nvPicPr>
+              <p:cNvPr id="18" name="Picture 17" descr="Logo_2017.tiff"/>
+              <p:cNvPicPr>
+                <a:picLocks noChangeAspect="1"/>
+              </p:cNvPicPr>
+              <p:nvPr/>
+            </p:nvPicPr>
+            <p:blipFill>
+              <a:blip r:embed="rId14" cstate="print"/>
+              <a:stretch>
+                <a:fillRect/>
+              </a:stretch>
+            </p:blipFill>
+            <p:spPr>
+              <a:xfrm>
+                <a:off x="25262717" y="2250133"/>
+                <a:ext cx="4132262" cy="2221295"/>
+              </a:xfrm>
+              <a:prstGeom prst="rect">
+                <a:avLst/>
+              </a:prstGeom>
+            </p:spPr>
+          </p:pic>
+          <p:pic>
+            <p:nvPicPr>
+              <p:cNvPr id="19" name="Picture 18" descr="logoJEDI_whitebg.png"/>
+              <p:cNvPicPr>
+                <a:picLocks noChangeAspect="1"/>
+              </p:cNvPicPr>
+              <p:nvPr/>
+            </p:nvPicPr>
+            <p:blipFill>
+              <a:blip r:embed="rId15" cstate="print"/>
+              <a:stretch>
+                <a:fillRect/>
+              </a:stretch>
+            </p:blipFill>
+            <p:spPr>
+              <a:xfrm>
+                <a:off x="21692715" y="2392166"/>
+                <a:ext cx="3449432" cy="1874192"/>
+              </a:xfrm>
+              <a:prstGeom prst="rect">
+                <a:avLst/>
+              </a:prstGeom>
+            </p:spPr>
+          </p:pic>
+        </p:grpSp>
+        <p:grpSp>
+          <p:nvGrpSpPr>
+            <p:cNvPr id="52" name="Group 51"/>
+            <p:cNvGrpSpPr/>
+            <p:nvPr/>
+          </p:nvGrpSpPr>
+          <p:grpSpPr>
+            <a:xfrm>
+              <a:off x="1054698" y="2352968"/>
+              <a:ext cx="6596457" cy="2705478"/>
+              <a:chOff x="15603701" y="1890094"/>
+              <a:chExt cx="6596457" cy="2705478"/>
+            </a:xfrm>
+          </p:grpSpPr>
+          <p:pic>
+            <p:nvPicPr>
+              <p:cNvPr id="49" name="Picture 48" descr="Julich_logo.png"/>
+              <p:cNvPicPr>
+                <a:picLocks noChangeAspect="1"/>
+              </p:cNvPicPr>
+              <p:nvPr/>
+            </p:nvPicPr>
+            <p:blipFill>
+              <a:blip r:embed="rId16" cstate="print"/>
+              <a:stretch>
+                <a:fillRect/>
+              </a:stretch>
+            </p:blipFill>
+            <p:spPr>
+              <a:xfrm>
+                <a:off x="18092315" y="2466158"/>
+                <a:ext cx="4107843" cy="1372372"/>
+              </a:xfrm>
+              <a:prstGeom prst="rect">
+                <a:avLst/>
+              </a:prstGeom>
+            </p:spPr>
+          </p:pic>
+          <p:pic>
+            <p:nvPicPr>
+              <p:cNvPr id="51" name="Picture 50" descr="MEPhI_logo.png"/>
+              <p:cNvPicPr>
+                <a:picLocks noChangeAspect="1"/>
+              </p:cNvPicPr>
+              <p:nvPr/>
+            </p:nvPicPr>
+            <p:blipFill>
+              <a:blip r:embed="rId17" cstate="print"/>
+              <a:stretch>
+                <a:fillRect/>
+              </a:stretch>
+            </p:blipFill>
+            <p:spPr>
+              <a:xfrm>
+                <a:off x="15603701" y="1890094"/>
+                <a:ext cx="2200582" cy="2705478"/>
+              </a:xfrm>
+              <a:prstGeom prst="rect">
+                <a:avLst/>
+              </a:prstGeom>
+            </p:spPr>
+          </p:pic>
+        </p:grpSp>
+        <p:sp>
+          <p:nvSpPr>
+            <p:cNvPr id="54" name="TextBox 53"/>
+            <p:cNvSpPr txBox="1"/>
+            <p:nvPr/>
+          </p:nvSpPr>
+          <p:spPr>
+            <a:xfrm>
+              <a:off x="1870970" y="1110780"/>
+              <a:ext cx="26538034" cy="923330"/>
+            </a:xfrm>
+            <a:prstGeom prst="rect">
+              <a:avLst/>
+            </a:prstGeom>
+            <a:noFill/>
+          </p:spPr>
+          <p:txBody>
+            <a:bodyPr wrap="none" rtlCol="0">
+              <a:spAutoFit/>
+            </a:bodyPr>
+            <a:lstStyle/>
+            <a:p>
+              <a:r>
+                <a:rPr lang="ru-RU" sz="5400" b="1" dirty="0" err="1" smtClean="0"/>
+                <a:t>Model</a:t>
+              </a:r>
+              <a:r>
+                <a:rPr lang="ru-RU" sz="5400" b="1" dirty="0" smtClean="0"/>
+                <a:t> </a:t>
+              </a:r>
+              <a:r>
+                <a:rPr lang="ru-RU" sz="5400" b="1" dirty="0" err="1" smtClean="0"/>
+                <a:t>of</a:t>
+              </a:r>
+              <a:r>
+                <a:rPr lang="ru-RU" sz="5400" b="1" dirty="0" smtClean="0"/>
+                <a:t> </a:t>
+              </a:r>
+              <a:r>
+                <a:rPr lang="ru-RU" sz="5400" b="1" dirty="0" err="1" smtClean="0"/>
+                <a:t>statistical</a:t>
+              </a:r>
+              <a:r>
+                <a:rPr lang="ru-RU" sz="5400" b="1" dirty="0" smtClean="0"/>
+                <a:t> </a:t>
+              </a:r>
+              <a:r>
+                <a:rPr lang="ru-RU" sz="5400" b="1" dirty="0" err="1" smtClean="0"/>
+                <a:t>errors</a:t>
+              </a:r>
+              <a:r>
+                <a:rPr lang="ru-RU" sz="5400" b="1" dirty="0" smtClean="0"/>
+                <a:t> </a:t>
+              </a:r>
+              <a:r>
+                <a:rPr lang="ru-RU" sz="5400" b="1" dirty="0" err="1" smtClean="0"/>
+                <a:t>in</a:t>
+              </a:r>
+              <a:r>
+                <a:rPr lang="ru-RU" sz="5400" b="1" dirty="0" smtClean="0"/>
+                <a:t> </a:t>
+              </a:r>
+              <a:r>
+                <a:rPr lang="ru-RU" sz="5400" b="1" dirty="0" err="1" smtClean="0"/>
+                <a:t>the</a:t>
+              </a:r>
+              <a:r>
+                <a:rPr lang="ru-RU" sz="5400" b="1" dirty="0" smtClean="0"/>
+                <a:t> </a:t>
+              </a:r>
+              <a:r>
+                <a:rPr lang="ru-RU" sz="5400" b="1" dirty="0" err="1" smtClean="0"/>
+                <a:t>search</a:t>
+              </a:r>
+              <a:r>
+                <a:rPr lang="ru-RU" sz="5400" b="1" dirty="0" smtClean="0"/>
+                <a:t> </a:t>
+              </a:r>
+              <a:r>
+                <a:rPr lang="ru-RU" sz="5400" b="1" dirty="0" err="1" smtClean="0"/>
+                <a:t>for</a:t>
+              </a:r>
+              <a:r>
+                <a:rPr lang="ru-RU" sz="5400" b="1" dirty="0" smtClean="0"/>
+                <a:t> </a:t>
+              </a:r>
+              <a:r>
+                <a:rPr lang="ru-RU" sz="5400" b="1" dirty="0" err="1" smtClean="0"/>
+                <a:t>the</a:t>
+              </a:r>
+              <a:r>
+                <a:rPr lang="ru-RU" sz="5400" b="1" dirty="0" smtClean="0"/>
+                <a:t> </a:t>
+              </a:r>
+              <a:r>
+                <a:rPr lang="ru-RU" sz="5400" b="1" dirty="0" err="1" smtClean="0"/>
+                <a:t>deuteron</a:t>
+              </a:r>
+              <a:r>
+                <a:rPr lang="ru-RU" sz="5400" b="1" dirty="0" smtClean="0"/>
+                <a:t> EDM </a:t>
+              </a:r>
+              <a:r>
+                <a:rPr lang="ru-RU" sz="5400" b="1" dirty="0" err="1" smtClean="0"/>
+                <a:t>in</a:t>
+              </a:r>
+              <a:r>
+                <a:rPr lang="ru-RU" sz="5400" b="1" dirty="0" smtClean="0"/>
+                <a:t> </a:t>
+              </a:r>
+              <a:r>
+                <a:rPr lang="ru-RU" sz="5400" b="1" dirty="0" err="1" smtClean="0"/>
+                <a:t>the</a:t>
+              </a:r>
+              <a:r>
+                <a:rPr lang="ru-RU" sz="5400" b="1" dirty="0" smtClean="0"/>
+                <a:t> </a:t>
+              </a:r>
+              <a:r>
+                <a:rPr lang="ru-RU" sz="5400" b="1" dirty="0" err="1" smtClean="0"/>
+                <a:t>storage</a:t>
+              </a:r>
+              <a:r>
+                <a:rPr lang="ru-RU" sz="5400" b="1" dirty="0" smtClean="0"/>
+                <a:t> </a:t>
+              </a:r>
+              <a:r>
+                <a:rPr lang="ru-RU" sz="5400" b="1" dirty="0" err="1" smtClean="0"/>
+                <a:t>ring</a:t>
+              </a:r>
+              <a:endParaRPr lang="ru-RU" dirty="0"/>
+            </a:p>
+          </p:txBody>
+        </p:sp>
+        <p:sp>
+          <p:nvSpPr>
+            <p:cNvPr id="55" name="TextBox 54"/>
+            <p:cNvSpPr txBox="1"/>
+            <p:nvPr/>
+          </p:nvSpPr>
+          <p:spPr>
+            <a:xfrm>
+              <a:off x="7795171" y="2394150"/>
+              <a:ext cx="13897544" cy="3170099"/>
+            </a:xfrm>
+            <a:prstGeom prst="rect">
+              <a:avLst/>
+            </a:prstGeom>
+            <a:noFill/>
+          </p:spPr>
+          <p:txBody>
+            <a:bodyPr wrap="square" rtlCol="0">
+              <a:spAutoFit/>
+            </a:bodyPr>
+            <a:lstStyle/>
+            <a:p>
+              <a:pPr marL="742950" indent="-742950" algn="ctr"/>
+              <a:r>
+                <a:rPr lang="en-US" sz="4000" dirty="0" smtClean="0"/>
+                <a:t>A. </a:t>
+              </a:r>
+              <a:r>
+                <a:rPr lang="en-US" sz="4000" dirty="0" err="1" smtClean="0"/>
+                <a:t>Aksentyev</a:t>
+              </a:r>
+              <a:r>
+                <a:rPr lang="en-US" sz="4000" dirty="0" smtClean="0"/>
+                <a:t>,</a:t>
+              </a:r>
+            </a:p>
+            <a:p>
+              <a:pPr marL="742950" indent="-742950" algn="ctr"/>
+              <a:r>
+                <a:rPr lang="en-US" sz="4000" dirty="0" smtClean="0"/>
+                <a:t>Institute for Nuclear Physics, </a:t>
+              </a:r>
+              <a:r>
+                <a:rPr lang="en-US" sz="4000" dirty="0" err="1" smtClean="0"/>
+                <a:t>Forschugszentrum</a:t>
+              </a:r>
+              <a:r>
+                <a:rPr lang="en-US" sz="4000" dirty="0" smtClean="0"/>
+                <a:t> </a:t>
+              </a:r>
+              <a:r>
+                <a:rPr lang="en-US" sz="4000" dirty="0" err="1" smtClean="0"/>
+                <a:t>Jülich</a:t>
+              </a:r>
+              <a:r>
+                <a:rPr lang="en-US" sz="4000" dirty="0" smtClean="0"/>
+                <a:t>, </a:t>
+              </a:r>
+              <a:r>
+                <a:rPr lang="en-US" sz="4000" dirty="0" smtClean="0"/>
+                <a:t>Germany</a:t>
+              </a:r>
+            </a:p>
+            <a:p>
+              <a:pPr marL="742950" indent="-742950" algn="ctr"/>
+              <a:r>
+                <a:rPr lang="en-US" sz="4000" dirty="0" smtClean="0"/>
+                <a:t>National Research Nuclear University “</a:t>
+              </a:r>
+              <a:r>
+                <a:rPr lang="en-US" sz="4000" dirty="0" err="1" smtClean="0"/>
+                <a:t>MEPhI</a:t>
+              </a:r>
+              <a:r>
+                <a:rPr lang="en-US" sz="4000" dirty="0" smtClean="0"/>
+                <a:t>,” Moscow, Russia</a:t>
+              </a:r>
+              <a:endParaRPr lang="ru-RU" sz="4000" dirty="0"/>
+            </a:p>
+          </p:txBody>
+        </p:sp>
+      </p:grpSp>
+      <p:grpSp>
+        <p:nvGrpSpPr>
+          <p:cNvPr id="58" name="Group 57"/>
+          <p:cNvGrpSpPr/>
+          <p:nvPr/>
+        </p:nvGrpSpPr>
+        <p:grpSpPr>
+          <a:xfrm>
+            <a:off x="838674" y="5562501"/>
+            <a:ext cx="28702913" cy="6449077"/>
+            <a:chOff x="838674" y="5562501"/>
+            <a:chExt cx="28702913" cy="6449077"/>
+          </a:xfrm>
+        </p:grpSpPr>
+        <p:pic>
+          <p:nvPicPr>
+            <p:cNvPr id="37" name="Picture 36" descr="neutron_dipole_moment.png"/>
+            <p:cNvPicPr>
+              <a:picLocks noChangeAspect="1"/>
+            </p:cNvPicPr>
+            <p:nvPr/>
+          </p:nvPicPr>
+          <p:blipFill>
+            <a:blip r:embed="rId18" cstate="print"/>
+            <a:stretch>
+              <a:fillRect/>
+            </a:stretch>
+          </p:blipFill>
+          <p:spPr>
+            <a:xfrm>
+              <a:off x="838674" y="5562501"/>
+              <a:ext cx="4847926" cy="6449077"/>
+            </a:xfrm>
+            <a:prstGeom prst="rect">
+              <a:avLst/>
+            </a:prstGeom>
+          </p:spPr>
+        </p:pic>
+        <p:sp>
+          <p:nvSpPr>
+            <p:cNvPr id="56" name="TextBox 55"/>
+            <p:cNvSpPr txBox="1"/>
+            <p:nvPr/>
+          </p:nvSpPr>
+          <p:spPr>
+            <a:xfrm>
+              <a:off x="6859067" y="6370993"/>
+              <a:ext cx="22682520" cy="4832092"/>
+            </a:xfrm>
+            <a:prstGeom prst="rect">
+              <a:avLst/>
+            </a:prstGeom>
+            <a:noFill/>
+          </p:spPr>
+          <p:txBody>
+            <a:bodyPr wrap="square" rtlCol="0">
+              <a:spAutoFit/>
+            </a:bodyPr>
+            <a:lstStyle/>
+            <a:p>
+              <a:r>
+                <a:rPr lang="en-US" sz="4400" dirty="0" smtClean="0"/>
+                <a:t>By allowing for values within experimental reach, particle EDMs serve as excellent probes for physics beyond the SM. The storage ring method for searching for the deuteron EDM consists in measuring the beam spin tune via </a:t>
+              </a:r>
+              <a:r>
+                <a:rPr lang="en-US" sz="4400" dirty="0" err="1" smtClean="0"/>
+                <a:t>polarimetry</a:t>
+              </a:r>
+              <a:r>
+                <a:rPr lang="en-US" sz="4400" dirty="0" smtClean="0"/>
+                <a:t>. Since the number of particles in one fill is limited, one must maximize the utility of the beam. This raises the question of sampling efficiency, as the signal, being an oscillating function, varies in informational content. To address this question, we define a numerical model and compare the uniform and frequency-modulated sampling strategies. </a:t>
+              </a:r>
+              <a:endParaRPr lang="ru-RU" sz="4400" dirty="0"/>
+            </a:p>
+          </p:txBody>
+        </p:sp>
+      </p:grpSp>
     </p:spTree>
   </p:cSld>
   <p:clrMapOvr>

</xml_diff>

<commit_message>
IPAC 17 poster final
</commit_message>
<xml_diff>
--- a/Reports/IPAC17_poster.pptx
+++ b/Reports/IPAC17_poster.pptx
@@ -501,7 +501,7 @@
           </a:ln>
           <a:extLst>
             <a:ext uri="{91240B29-F687-4F45-9708-019B960494DF}">
-              <a14:hiddenLine xmlns="" xmlns:a14="http://schemas.microsoft.com/office/drawing/2010/main" w="9525">
+              <a14:hiddenLine xmlns:a14="http://schemas.microsoft.com/office/drawing/2010/main" xmlns="" w="9525">
                 <a:solidFill>
                   <a:srgbClr val="000000"/>
                 </a:solidFill>
@@ -650,7 +650,7 @@
           </a:ln>
           <a:extLst>
             <a:ext uri="{91240B29-F687-4F45-9708-019B960494DF}">
-              <a14:hiddenLine xmlns="" xmlns:a14="http://schemas.microsoft.com/office/drawing/2010/main" w="9525">
+              <a14:hiddenLine xmlns:a14="http://schemas.microsoft.com/office/drawing/2010/main" xmlns="" w="9525">
                 <a:solidFill>
                   <a:srgbClr val="000000"/>
                 </a:solidFill>
@@ -799,7 +799,7 @@
           </a:ln>
           <a:extLst>
             <a:ext uri="{91240B29-F687-4F45-9708-019B960494DF}">
-              <a14:hiddenLine xmlns="" xmlns:a14="http://schemas.microsoft.com/office/drawing/2010/main" w="9525">
+              <a14:hiddenLine xmlns:a14="http://schemas.microsoft.com/office/drawing/2010/main" xmlns="" w="9525">
                 <a:solidFill>
                   <a:srgbClr val="000000"/>
                 </a:solidFill>
@@ -945,7 +945,7 @@
           </a:ln>
           <a:extLst>
             <a:ext uri="{91240B29-F687-4F45-9708-019B960494DF}">
-              <a14:hiddenLine xmlns="" xmlns:a14="http://schemas.microsoft.com/office/drawing/2010/main" w="9525">
+              <a14:hiddenLine xmlns:a14="http://schemas.microsoft.com/office/drawing/2010/main" xmlns="" w="9525">
                 <a:solidFill>
                   <a:srgbClr val="000000"/>
                 </a:solidFill>
@@ -1091,7 +1091,7 @@
           </a:ln>
           <a:extLst>
             <a:ext uri="{91240B29-F687-4F45-9708-019B960494DF}">
-              <a14:hiddenLine xmlns="" xmlns:a14="http://schemas.microsoft.com/office/drawing/2010/main" w="9525">
+              <a14:hiddenLine xmlns:a14="http://schemas.microsoft.com/office/drawing/2010/main" xmlns="" w="9525">
                 <a:solidFill>
                   <a:srgbClr val="000000"/>
                 </a:solidFill>
@@ -1240,7 +1240,7 @@
           </a:ln>
           <a:extLst>
             <a:ext uri="{91240B29-F687-4F45-9708-019B960494DF}">
-              <a14:hiddenLine xmlns="" xmlns:a14="http://schemas.microsoft.com/office/drawing/2010/main" w="9525">
+              <a14:hiddenLine xmlns:a14="http://schemas.microsoft.com/office/drawing/2010/main" xmlns="" w="9525">
                 <a:solidFill>
                   <a:srgbClr val="000000"/>
                 </a:solidFill>
@@ -1384,14 +1384,14 @@
           </a:ln>
           <a:extLst>
             <a:ext uri="{909E8E84-426E-40DD-AFC4-6F175D3DCCD1}">
-              <a14:hiddenFill xmlns="" xmlns:a14="http://schemas.microsoft.com/office/drawing/2010/main">
+              <a14:hiddenFill xmlns:a14="http://schemas.microsoft.com/office/drawing/2010/main" xmlns="">
                 <a:solidFill>
                   <a:srgbClr val="FFFFFF"/>
                 </a:solidFill>
               </a14:hiddenFill>
             </a:ext>
             <a:ext uri="{91240B29-F687-4F45-9708-019B960494DF}">
-              <a14:hiddenLine xmlns="" xmlns:a14="http://schemas.microsoft.com/office/drawing/2010/main" w="9525">
+              <a14:hiddenLine xmlns:a14="http://schemas.microsoft.com/office/drawing/2010/main" xmlns="" w="9525">
                 <a:solidFill>
                   <a:srgbClr val="000000"/>
                 </a:solidFill>
@@ -1559,14 +1559,14 @@
           </a:ln>
           <a:extLst>
             <a:ext uri="{909E8E84-426E-40DD-AFC4-6F175D3DCCD1}">
-              <a14:hiddenFill xmlns="" xmlns:a14="http://schemas.microsoft.com/office/drawing/2010/main">
+              <a14:hiddenFill xmlns:a14="http://schemas.microsoft.com/office/drawing/2010/main" xmlns="">
                 <a:solidFill>
                   <a:srgbClr val="FFFFFF"/>
                 </a:solidFill>
               </a14:hiddenFill>
             </a:ext>
             <a:ext uri="{91240B29-F687-4F45-9708-019B960494DF}">
-              <a14:hiddenLine xmlns="" xmlns:a14="http://schemas.microsoft.com/office/drawing/2010/main" w="9525">
+              <a14:hiddenLine xmlns:a14="http://schemas.microsoft.com/office/drawing/2010/main" xmlns="" w="9525">
                 <a:solidFill>
                   <a:srgbClr val="000000"/>
                 </a:solidFill>
@@ -5536,7 +5536,7 @@
           </a:ln>
           <a:extLst>
             <a:ext uri="{91240B29-F687-4F45-9708-019B960494DF}">
-              <a14:hiddenLine xmlns="" xmlns:a14="http://schemas.microsoft.com/office/drawing/2010/main" w="9525">
+              <a14:hiddenLine xmlns:a14="http://schemas.microsoft.com/office/drawing/2010/main" xmlns="" w="9525">
                 <a:solidFill>
                   <a:srgbClr val="000000"/>
                 </a:solidFill>
@@ -5682,7 +5682,7 @@
           </a:ln>
           <a:extLst>
             <a:ext uri="{91240B29-F687-4F45-9708-019B960494DF}">
-              <a14:hiddenLine xmlns="" xmlns:a14="http://schemas.microsoft.com/office/drawing/2010/main" w="9525">
+              <a14:hiddenLine xmlns:a14="http://schemas.microsoft.com/office/drawing/2010/main" xmlns="" w="9525">
                 <a:solidFill>
                   <a:srgbClr val="000000"/>
                 </a:solidFill>
@@ -5828,7 +5828,7 @@
           </a:ln>
           <a:extLst>
             <a:ext uri="{91240B29-F687-4F45-9708-019B960494DF}">
-              <a14:hiddenLine xmlns="" xmlns:a14="http://schemas.microsoft.com/office/drawing/2010/main" w="9525">
+              <a14:hiddenLine xmlns:a14="http://schemas.microsoft.com/office/drawing/2010/main" xmlns="" w="9525">
                 <a:solidFill>
                   <a:srgbClr val="000000"/>
                 </a:solidFill>
@@ -5974,7 +5974,7 @@
           </a:ln>
           <a:extLst>
             <a:ext uri="{91240B29-F687-4F45-9708-019B960494DF}">
-              <a14:hiddenLine xmlns="" xmlns:a14="http://schemas.microsoft.com/office/drawing/2010/main" w="9525">
+              <a14:hiddenLine xmlns:a14="http://schemas.microsoft.com/office/drawing/2010/main" xmlns="" w="9525">
                 <a:solidFill>
                   <a:srgbClr val="000000"/>
                 </a:solidFill>
@@ -6123,7 +6123,7 @@
           </a:ln>
           <a:extLst>
             <a:ext uri="{91240B29-F687-4F45-9708-019B960494DF}">
-              <a14:hiddenLine xmlns="" xmlns:a14="http://schemas.microsoft.com/office/drawing/2010/main" w="9525">
+              <a14:hiddenLine xmlns:a14="http://schemas.microsoft.com/office/drawing/2010/main" xmlns="" w="9525">
                 <a:solidFill>
                   <a:srgbClr val="000000"/>
                 </a:solidFill>
@@ -6267,14 +6267,14 @@
           </a:ln>
           <a:extLst>
             <a:ext uri="{909E8E84-426E-40DD-AFC4-6F175D3DCCD1}">
-              <a14:hiddenFill xmlns="" xmlns:a14="http://schemas.microsoft.com/office/drawing/2010/main">
+              <a14:hiddenFill xmlns:a14="http://schemas.microsoft.com/office/drawing/2010/main" xmlns="">
                 <a:solidFill>
                   <a:srgbClr val="FFFFFF"/>
                 </a:solidFill>
               </a14:hiddenFill>
             </a:ext>
             <a:ext uri="{91240B29-F687-4F45-9708-019B960494DF}">
-              <a14:hiddenLine xmlns="" xmlns:a14="http://schemas.microsoft.com/office/drawing/2010/main" w="9525">
+              <a14:hiddenLine xmlns:a14="http://schemas.microsoft.com/office/drawing/2010/main" xmlns="" w="9525">
                 <a:solidFill>
                   <a:srgbClr val="000000"/>
                 </a:solidFill>
@@ -6434,14 +6434,14 @@
           </a:ln>
           <a:extLst>
             <a:ext uri="{909E8E84-426E-40DD-AFC4-6F175D3DCCD1}">
-              <a14:hiddenFill xmlns="" xmlns:a14="http://schemas.microsoft.com/office/drawing/2010/main">
+              <a14:hiddenFill xmlns:a14="http://schemas.microsoft.com/office/drawing/2010/main" xmlns="">
                 <a:solidFill>
                   <a:srgbClr val="FFFFFF"/>
                 </a:solidFill>
               </a14:hiddenFill>
             </a:ext>
             <a:ext uri="{91240B29-F687-4F45-9708-019B960494DF}">
-              <a14:hiddenLine xmlns="" xmlns:a14="http://schemas.microsoft.com/office/drawing/2010/main" w="9525">
+              <a14:hiddenLine xmlns:a14="http://schemas.microsoft.com/office/drawing/2010/main" xmlns="" w="9525">
                 <a:solidFill>
                   <a:srgbClr val="000000"/>
                 </a:solidFill>
@@ -8974,19 +8974,40 @@
                 <a:t>A. </a:t>
               </a:r>
               <a:r>
-                <a:rPr lang="en-US" sz="4000" dirty="0" err="1" smtClean="0"/>
+                <a:rPr lang="en-US" sz="4000" dirty="0" smtClean="0"/>
                 <a:t>Aksentyev</a:t>
+              </a:r>
+              <a:r>
+                <a:rPr lang="en-US" sz="4000" baseline="30000" dirty="0" smtClean="0"/>
+                <a:t>1,2</a:t>
+              </a:r>
+              <a:r>
+                <a:rPr lang="en-US" sz="4000" dirty="0" smtClean="0"/>
+                <a:t>, Y. Senichev</a:t>
+              </a:r>
+              <a:r>
+                <a:rPr lang="en-US" sz="4000" baseline="30000" dirty="0" smtClean="0"/>
+                <a:t>1</a:t>
               </a:r>
               <a:r>
                 <a:rPr lang="en-US" sz="4000" dirty="0" smtClean="0"/>
                 <a:t>,</a:t>
               </a:r>
+              <a:endParaRPr lang="en-US" sz="4000" dirty="0" smtClean="0"/>
             </a:p>
             <a:p>
               <a:pPr marL="742950" indent="-742950" algn="ctr"/>
               <a:r>
+                <a:rPr lang="en-US" sz="4000" baseline="30000" dirty="0" smtClean="0"/>
+                <a:t>1</a:t>
+              </a:r>
+              <a:r>
                 <a:rPr lang="en-US" sz="4000" dirty="0" smtClean="0"/>
-                <a:t>Institute for Nuclear Physics, </a:t>
+                <a:t> Institute </a:t>
+              </a:r>
+              <a:r>
+                <a:rPr lang="en-US" sz="4000" dirty="0" smtClean="0"/>
+                <a:t>for Nuclear Physics, </a:t>
               </a:r>
               <a:r>
                 <a:rPr lang="en-US" sz="4000" dirty="0" err="1" smtClean="0"/>
@@ -9005,6 +9026,14 @@
                 <a:t>, </a:t>
               </a:r>
               <a:r>
+                <a:rPr lang="en-US" sz="4000" dirty="0" err="1" smtClean="0"/>
+                <a:t>Jülich</a:t>
+              </a:r>
+              <a:r>
+                <a:rPr lang="en-US" sz="4000" dirty="0" smtClean="0"/>
+                <a:t>, </a:t>
+              </a:r>
+              <a:r>
                 <a:rPr lang="en-US" sz="4000" dirty="0" smtClean="0"/>
                 <a:t>Germany</a:t>
               </a:r>
@@ -9012,8 +9041,16 @@
             <a:p>
               <a:pPr marL="742950" indent="-742950" algn="ctr"/>
               <a:r>
+                <a:rPr lang="en-US" sz="4000" baseline="30000" dirty="0" smtClean="0"/>
+                <a:t>2</a:t>
+              </a:r>
+              <a:r>
                 <a:rPr lang="en-US" sz="4000" dirty="0" smtClean="0"/>
-                <a:t>National Research Nuclear University “</a:t>
+                <a:t> National </a:t>
+              </a:r>
+              <a:r>
+                <a:rPr lang="en-US" sz="4000" dirty="0" smtClean="0"/>
+                <a:t>Research Nuclear University “</a:t>
               </a:r>
               <a:r>
                 <a:rPr lang="en-US" sz="4000" dirty="0" err="1" smtClean="0"/>

</xml_diff>